<commit_message>
Remove worldwallet & add re-balancing
</commit_message>
<xml_diff>
--- a/doc/ETH Global - IntentPay.pptx
+++ b/doc/ETH Global - IntentPay.pptx
@@ -5,10 +5,10 @@
     <p:sldMasterId id="2147483648" r:id="rId1"/>
   </p:sldMasterIdLst>
   <p:notesMasterIdLst>
-    <p:notesMasterId r:id="rId21"/>
+    <p:notesMasterId r:id="rId23"/>
   </p:notesMasterIdLst>
   <p:handoutMasterIdLst>
-    <p:handoutMasterId r:id="rId22"/>
+    <p:handoutMasterId r:id="rId24"/>
   </p:handoutMasterIdLst>
   <p:sldIdLst>
     <p:sldId id="256" r:id="rId2"/>
@@ -18,18 +18,20 @@
     <p:sldId id="276" r:id="rId6"/>
     <p:sldId id="273" r:id="rId7"/>
     <p:sldId id="277" r:id="rId8"/>
-    <p:sldId id="278" r:id="rId9"/>
-    <p:sldId id="279" r:id="rId10"/>
-    <p:sldId id="280" r:id="rId11"/>
-    <p:sldId id="275" r:id="rId12"/>
-    <p:sldId id="266" r:id="rId13"/>
-    <p:sldId id="268" r:id="rId14"/>
-    <p:sldId id="269" r:id="rId15"/>
-    <p:sldId id="257" r:id="rId16"/>
-    <p:sldId id="258" r:id="rId17"/>
-    <p:sldId id="259" r:id="rId18"/>
-    <p:sldId id="260" r:id="rId19"/>
-    <p:sldId id="261" r:id="rId20"/>
+    <p:sldId id="282" r:id="rId9"/>
+    <p:sldId id="278" r:id="rId10"/>
+    <p:sldId id="279" r:id="rId11"/>
+    <p:sldId id="280" r:id="rId12"/>
+    <p:sldId id="281" r:id="rId13"/>
+    <p:sldId id="275" r:id="rId14"/>
+    <p:sldId id="266" r:id="rId15"/>
+    <p:sldId id="268" r:id="rId16"/>
+    <p:sldId id="269" r:id="rId17"/>
+    <p:sldId id="257" r:id="rId18"/>
+    <p:sldId id="258" r:id="rId19"/>
+    <p:sldId id="259" r:id="rId20"/>
+    <p:sldId id="260" r:id="rId21"/>
+    <p:sldId id="261" r:id="rId22"/>
   </p:sldIdLst>
   <p:sldSz cx="12192000" cy="6858000"/>
   <p:notesSz cx="6858000" cy="9144000"/>
@@ -3579,6 +3581,95 @@
           <a:bodyPr/>
           <a:lstStyle/>
           <a:p>
+            <a:pPr>
+              <a:buNone/>
+            </a:pPr>
+            <a:r>
+              <a:rPr lang="en-US" dirty="0"/>
+              <a:t>Now, instead of walking through every step here,</a:t>
+            </a:r>
+            <a:br>
+              <a:rPr lang="en-US" dirty="0"/>
+            </a:br>
+            <a:r>
+              <a:rPr lang="en-US" dirty="0"/>
+              <a:t>I’m going to show you these two journeys — </a:t>
+            </a:r>
+            <a:r>
+              <a:rPr lang="en-US" b="1" dirty="0"/>
+              <a:t>Intent Pay and Intent Wallet</a:t>
+            </a:r>
+            <a:r>
+              <a:rPr lang="en-US" dirty="0"/>
+              <a:t> — live in the demo.</a:t>
+            </a:r>
+          </a:p>
+          <a:p>
+            <a:pPr>
+              <a:buNone/>
+            </a:pPr>
+            <a:r>
+              <a:rPr lang="en-US" dirty="0"/>
+              <a:t>You’ll see how easy it is to make a cross-chain payment with no wallet, and how a user can instantly onboard into DeFi with just USDC.</a:t>
+            </a:r>
+          </a:p>
+          <a:p>
+            <a:r>
+              <a:rPr lang="en-US" dirty="0"/>
+              <a:t>So keep these flows in mind as we head into the demo</a:t>
+            </a:r>
+          </a:p>
+          <a:p>
+            <a:pPr>
+              <a:buNone/>
+            </a:pPr>
+            <a:endParaRPr lang="en-US" dirty="0"/>
+          </a:p>
+          <a:p>
+            <a:pPr>
+              <a:buNone/>
+            </a:pPr>
+            <a:endParaRPr lang="en-US" dirty="0"/>
+          </a:p>
+          <a:p>
+            <a:pPr>
+              <a:buNone/>
+            </a:pPr>
+            <a:r>
+              <a:rPr lang="en-US" dirty="0"/>
+              <a:t>For more advanced users, Intent Wallet is created automatically with your World App login.</a:t>
+            </a:r>
+          </a:p>
+          <a:p>
+            <a:pPr>
+              <a:buNone/>
+            </a:pPr>
+            <a:r>
+              <a:rPr lang="en-US" dirty="0"/>
+              <a:t>You fund it with USDC, then use it to swap, transfer, and interact with DeFi.</a:t>
+            </a:r>
+          </a:p>
+          <a:p>
+            <a:r>
+              <a:rPr lang="en-US" dirty="0"/>
+              <a:t>It’s self-custodial, gas-free, and multi-chain — but still </a:t>
+            </a:r>
+            <a:r>
+              <a:rPr lang="en-US" dirty="0" err="1"/>
+              <a:t>passwordless</a:t>
+            </a:r>
+            <a:r>
+              <a:rPr lang="en-US" dirty="0"/>
+              <a:t> and easy to manage.</a:t>
+            </a:r>
+          </a:p>
+          <a:p>
+            <a:endParaRPr lang="en-US" dirty="0"/>
+          </a:p>
+          <a:p>
+            <a:endParaRPr lang="en-US" dirty="0"/>
+          </a:p>
+          <a:p>
             <a:endParaRPr lang="en-US" dirty="0"/>
           </a:p>
         </p:txBody>
@@ -3601,6 +3692,90 @@
             <a:fld id="{E7D04132-4807-4C3F-BC94-48D8363387B0}" type="slidenum">
               <a:rPr lang="en-US" smtClean="0"/>
               <a:t>13</a:t>
+            </a:fld>
+            <a:endParaRPr lang="en-US"/>
+          </a:p>
+        </p:txBody>
+      </p:sp>
+    </p:spTree>
+    <p:extLst>
+      <p:ext uri="{BB962C8B-B14F-4D97-AF65-F5344CB8AC3E}">
+        <p14:creationId xmlns:p14="http://schemas.microsoft.com/office/powerpoint/2010/main" val="3238865715"/>
+      </p:ext>
+    </p:extLst>
+  </p:cSld>
+  <p:clrMapOvr>
+    <a:masterClrMapping/>
+  </p:clrMapOvr>
+</p:notes>
+</file>
+
+<file path=ppt/notesSlides/notesSlide11.xml><?xml version="1.0" encoding="utf-8"?>
+<p:notes xmlns:a="http://schemas.openxmlformats.org/drawingml/2006/main" xmlns:r="http://schemas.openxmlformats.org/officeDocument/2006/relationships" xmlns:p="http://schemas.openxmlformats.org/presentationml/2006/main">
+  <p:cSld>
+    <p:spTree>
+      <p:nvGrpSpPr>
+        <p:cNvPr id="1" name=""/>
+        <p:cNvGrpSpPr/>
+        <p:nvPr/>
+      </p:nvGrpSpPr>
+      <p:grpSpPr>
+        <a:xfrm>
+          <a:off x="0" y="0"/>
+          <a:ext cx="0" cy="0"/>
+          <a:chOff x="0" y="0"/>
+          <a:chExt cx="0" cy="0"/>
+        </a:xfrm>
+      </p:grpSpPr>
+      <p:sp>
+        <p:nvSpPr>
+          <p:cNvPr id="2" name="Slide Image Placeholder 1"/>
+          <p:cNvSpPr>
+            <a:spLocks noGrp="1" noRot="1" noChangeAspect="1"/>
+          </p:cNvSpPr>
+          <p:nvPr>
+            <p:ph type="sldImg"/>
+          </p:nvPr>
+        </p:nvSpPr>
+        <p:spPr/>
+      </p:sp>
+      <p:sp>
+        <p:nvSpPr>
+          <p:cNvPr id="3" name="Notes Placeholder 2"/>
+          <p:cNvSpPr>
+            <a:spLocks noGrp="1"/>
+          </p:cNvSpPr>
+          <p:nvPr>
+            <p:ph type="body" idx="1"/>
+          </p:nvPr>
+        </p:nvSpPr>
+        <p:spPr/>
+        <p:txBody>
+          <a:bodyPr/>
+          <a:lstStyle/>
+          <a:p>
+            <a:endParaRPr lang="en-US" dirty="0"/>
+          </a:p>
+        </p:txBody>
+      </p:sp>
+      <p:sp>
+        <p:nvSpPr>
+          <p:cNvPr id="4" name="Slide Number Placeholder 3"/>
+          <p:cNvSpPr>
+            <a:spLocks noGrp="1"/>
+          </p:cNvSpPr>
+          <p:nvPr>
+            <p:ph type="sldNum" sz="quarter" idx="5"/>
+          </p:nvPr>
+        </p:nvSpPr>
+        <p:spPr/>
+        <p:txBody>
+          <a:bodyPr/>
+          <a:lstStyle/>
+          <a:p>
+            <a:fld id="{E7D04132-4807-4C3F-BC94-48D8363387B0}" type="slidenum">
+              <a:rPr lang="en-US" smtClean="0"/>
+              <a:t>15</a:t>
             </a:fld>
             <a:endParaRPr lang="en-US"/>
           </a:p>
@@ -4438,10 +4613,67 @@
           <a:bodyPr/>
           <a:lstStyle/>
           <a:p>
+            <a:pPr marL="0" marR="0" lvl="0" indent="0" algn="l" defTabSz="914400" rtl="0" eaLnBrk="1" fontAlgn="auto" latinLnBrk="0" hangingPunct="1">
+              <a:lnSpc>
+                <a:spcPct val="100000"/>
+              </a:lnSpc>
+              <a:spcBef>
+                <a:spcPts val="0"/>
+              </a:spcBef>
+              <a:spcAft>
+                <a:spcPts val="0"/>
+              </a:spcAft>
+              <a:buClrTx/>
+              <a:buSzTx/>
+              <a:buFontTx/>
+              <a:buNone/>
+              <a:tabLst/>
+              <a:defRPr/>
+            </a:pPr>
             <a:r>
               <a:rPr lang="en-US" dirty="0"/>
-              <a:t>“MEV protection means your swaps are executed fairly, without bots stealing value from your transaction. It’s like private checkout for DeFi.”</a:t>
-            </a:r>
+              <a:t>In a multi-chain system like </a:t>
+            </a:r>
+            <a:r>
+              <a:rPr lang="en-US" dirty="0" err="1"/>
+              <a:t>IntentPay</a:t>
+            </a:r>
+            <a:r>
+              <a:rPr lang="en-US" dirty="0"/>
+              <a:t>, we hold USDC across chains like Ethereum, Base, and </a:t>
+            </a:r>
+            <a:r>
+              <a:rPr lang="en-US" altLang="zh-TW" dirty="0" err="1"/>
+              <a:t>Avax</a:t>
+            </a:r>
+            <a:r>
+              <a:rPr lang="en-US" dirty="0"/>
+              <a:t>.</a:t>
+            </a:r>
+            <a:br>
+              <a:rPr lang="en-US" dirty="0"/>
+            </a:br>
+            <a:r>
+              <a:rPr lang="en-US" dirty="0"/>
+              <a:t>But user demand varies — one chain may get heavy usage while another sits idle.</a:t>
+            </a:r>
+            <a:br>
+              <a:rPr lang="en-US" dirty="0"/>
+            </a:br>
+            <a:r>
+              <a:rPr lang="en-US" dirty="0"/>
+              <a:t>Sometimes, 1inch selects a different chain for the best swap route.</a:t>
+            </a:r>
+            <a:br>
+              <a:rPr lang="en-US" dirty="0"/>
+            </a:br>
+            <a:r>
+              <a:rPr lang="en-US" dirty="0"/>
+              <a:t>To ensure smooth execution, we rebalance USDC across chains using CCTP, so every chain has enough liquidity when needed.</a:t>
+            </a:r>
+          </a:p>
+          <a:p>
+            <a:endParaRPr lang="en-US" dirty="0"/>
           </a:p>
         </p:txBody>
       </p:sp>
@@ -4462,7 +4694,7 @@
           <a:p>
             <a:fld id="{E7D04132-4807-4C3F-BC94-48D8363387B0}" type="slidenum">
               <a:rPr lang="en-US" smtClean="0"/>
-              <a:t>9</a:t>
+              <a:t>8</a:t>
             </a:fld>
             <a:endParaRPr lang="en-US"/>
           </a:p>
@@ -4471,7 +4703,7 @@
     </p:spTree>
     <p:extLst>
       <p:ext uri="{BB962C8B-B14F-4D97-AF65-F5344CB8AC3E}">
-        <p14:creationId xmlns:p14="http://schemas.microsoft.com/office/powerpoint/2010/main" val="2105677416"/>
+        <p14:creationId xmlns:p14="http://schemas.microsoft.com/office/powerpoint/2010/main" val="747922720"/>
       </p:ext>
     </p:extLst>
   </p:cSld>
@@ -4525,96 +4757,10 @@
           <a:bodyPr/>
           <a:lstStyle/>
           <a:p>
-            <a:pPr>
-              <a:buNone/>
-            </a:pPr>
             <a:r>
               <a:rPr lang="en-US" dirty="0"/>
-              <a:t>Now, instead of walking through every step here,</a:t>
-            </a:r>
-            <a:br>
-              <a:rPr lang="en-US" dirty="0"/>
-            </a:br>
-            <a:r>
-              <a:rPr lang="en-US" dirty="0"/>
-              <a:t>I’m going to show you these two journeys — </a:t>
-            </a:r>
-            <a:r>
-              <a:rPr lang="en-US" b="1" dirty="0"/>
-              <a:t>Intent Pay and Intent Wallet</a:t>
-            </a:r>
-            <a:r>
-              <a:rPr lang="en-US" dirty="0"/>
-              <a:t> — live in the demo.</a:t>
-            </a:r>
-          </a:p>
-          <a:p>
-            <a:pPr>
-              <a:buNone/>
-            </a:pPr>
-            <a:r>
-              <a:rPr lang="en-US" dirty="0"/>
-              <a:t>You’ll see how easy it is to make a cross-chain payment with no wallet, and how a user can instantly onboard into DeFi with just USDC.</a:t>
-            </a:r>
-          </a:p>
-          <a:p>
-            <a:r>
-              <a:rPr lang="en-US" dirty="0"/>
-              <a:t>So keep these flows in mind as we head into the demo</a:t>
-            </a:r>
-          </a:p>
-          <a:p>
-            <a:pPr>
-              <a:buNone/>
-            </a:pPr>
-            <a:endParaRPr lang="en-US" dirty="0"/>
-          </a:p>
-          <a:p>
-            <a:pPr>
-              <a:buNone/>
-            </a:pPr>
-            <a:endParaRPr lang="en-US" dirty="0"/>
-          </a:p>
-          <a:p>
-            <a:pPr>
-              <a:buNone/>
-            </a:pPr>
-            <a:r>
-              <a:rPr lang="en-US" dirty="0"/>
-              <a:t>For more advanced users, Intent Wallet is created automatically with your World App login.</a:t>
-            </a:r>
-          </a:p>
-          <a:p>
-            <a:pPr>
-              <a:buNone/>
-            </a:pPr>
-            <a:r>
-              <a:rPr lang="en-US" dirty="0"/>
-              <a:t>You fund it with USDC, then use it to swap, transfer, and interact with DeFi.</a:t>
-            </a:r>
-          </a:p>
-          <a:p>
-            <a:r>
-              <a:rPr lang="en-US" dirty="0"/>
-              <a:t>It’s self-custodial, gas-free, and multi-chain — but still </a:t>
-            </a:r>
-            <a:r>
-              <a:rPr lang="en-US" dirty="0" err="1"/>
-              <a:t>passwordless</a:t>
-            </a:r>
-            <a:r>
-              <a:rPr lang="en-US" dirty="0"/>
-              <a:t> and easy to manage.</a:t>
-            </a:r>
-          </a:p>
-          <a:p>
-            <a:endParaRPr lang="en-US" dirty="0"/>
-          </a:p>
-          <a:p>
-            <a:endParaRPr lang="en-US" dirty="0"/>
-          </a:p>
-          <a:p>
-            <a:endParaRPr lang="en-US" dirty="0"/>
+              <a:t>“MEV protection means your swaps are executed fairly, without bots stealing value from your transaction. It’s like private checkout for DeFi.”</a:t>
+            </a:r>
           </a:p>
         </p:txBody>
       </p:sp>
@@ -4635,7 +4781,7 @@
           <a:p>
             <a:fld id="{E7D04132-4807-4C3F-BC94-48D8363387B0}" type="slidenum">
               <a:rPr lang="en-US" smtClean="0"/>
-              <a:t>11</a:t>
+              <a:t>10</a:t>
             </a:fld>
             <a:endParaRPr lang="en-US"/>
           </a:p>
@@ -4644,7 +4790,7 @@
     </p:spTree>
     <p:extLst>
       <p:ext uri="{BB962C8B-B14F-4D97-AF65-F5344CB8AC3E}">
-        <p14:creationId xmlns:p14="http://schemas.microsoft.com/office/powerpoint/2010/main" val="3238865715"/>
+        <p14:creationId xmlns:p14="http://schemas.microsoft.com/office/powerpoint/2010/main" val="2105677416"/>
       </p:ext>
     </p:extLst>
   </p:cSld>
@@ -8523,6 +8669,167 @@
           <p:cNvPr id="2" name="Title 1">
             <a:extLst>
               <a:ext uri="{FF2B5EF4-FFF2-40B4-BE49-F238E27FC236}">
+                <a16:creationId xmlns:a16="http://schemas.microsoft.com/office/drawing/2014/main" id="{3461F83C-1DFC-57DC-4A17-24AEC834DE29}"/>
+              </a:ext>
+            </a:extLst>
+          </p:cNvPr>
+          <p:cNvSpPr>
+            <a:spLocks noGrp="1"/>
+          </p:cNvSpPr>
+          <p:nvPr>
+            <p:ph type="title"/>
+          </p:nvPr>
+        </p:nvSpPr>
+        <p:spPr/>
+        <p:txBody>
+          <a:bodyPr/>
+          <a:lstStyle/>
+          <a:p>
+            <a:r>
+              <a:rPr lang="en-US" dirty="0"/>
+              <a:t>Q2: What tools did you use, and why?</a:t>
+            </a:r>
+          </a:p>
+        </p:txBody>
+      </p:sp>
+      <p:sp>
+        <p:nvSpPr>
+          <p:cNvPr id="3" name="Content Placeholder 2">
+            <a:extLst>
+              <a:ext uri="{FF2B5EF4-FFF2-40B4-BE49-F238E27FC236}">
+                <a16:creationId xmlns:a16="http://schemas.microsoft.com/office/drawing/2014/main" id="{F5FCDBEB-9306-9818-921C-1A5790C79403}"/>
+              </a:ext>
+            </a:extLst>
+          </p:cNvPr>
+          <p:cNvSpPr>
+            <a:spLocks noGrp="1"/>
+          </p:cNvSpPr>
+          <p:nvPr>
+            <p:ph idx="1"/>
+          </p:nvPr>
+        </p:nvSpPr>
+        <p:spPr/>
+        <p:txBody>
+          <a:bodyPr/>
+          <a:lstStyle/>
+          <a:p>
+            <a:pPr>
+              <a:buNone/>
+            </a:pPr>
+            <a:r>
+              <a:rPr lang="en-US" dirty="0"/>
+              <a:t>We choose </a:t>
+            </a:r>
+          </a:p>
+          <a:p>
+            <a:r>
+              <a:rPr lang="en-US" b="1" dirty="0"/>
+              <a:t>World App</a:t>
+            </a:r>
+            <a:r>
+              <a:rPr lang="en-US" dirty="0"/>
+              <a:t> provides human identity (World ID) and authentication</a:t>
+            </a:r>
+          </a:p>
+          <a:p>
+            <a:pPr>
+              <a:buFont typeface="Arial" panose="020B0604020202020204" pitchFamily="34" charset="0"/>
+              <a:buChar char="•"/>
+            </a:pPr>
+            <a:r>
+              <a:rPr lang="en-US" b="1" dirty="0"/>
+              <a:t>1inch Fusion+</a:t>
+            </a:r>
+            <a:r>
+              <a:rPr lang="en-US" dirty="0"/>
+              <a:t> gives us MEV-protected token swaps</a:t>
+            </a:r>
+          </a:p>
+          <a:p>
+            <a:pPr>
+              <a:buFont typeface="Arial" panose="020B0604020202020204" pitchFamily="34" charset="0"/>
+              <a:buChar char="•"/>
+            </a:pPr>
+            <a:r>
+              <a:rPr lang="en-US" b="1" dirty="0"/>
+              <a:t>Circle Modular Wallet</a:t>
+            </a:r>
+            <a:r>
+              <a:rPr lang="en-US" dirty="0"/>
+              <a:t> lets us create wallets and pay gas with USDC</a:t>
+            </a:r>
+          </a:p>
+          <a:p>
+            <a:pPr>
+              <a:buFont typeface="Arial" panose="020B0604020202020204" pitchFamily="34" charset="0"/>
+              <a:buChar char="•"/>
+            </a:pPr>
+            <a:r>
+              <a:rPr lang="en-US" b="1" dirty="0"/>
+              <a:t>CCTP v2</a:t>
+            </a:r>
+            <a:r>
+              <a:rPr lang="en-US" dirty="0"/>
+              <a:t> powers fast, secure cross-chain USDC transfers for Re-balancing our </a:t>
+            </a:r>
+            <a:r>
+              <a:rPr lang="en-US" dirty="0" err="1"/>
+              <a:t>PayMaster</a:t>
+            </a:r>
+            <a:r>
+              <a:rPr lang="en-US" dirty="0"/>
+              <a:t> account</a:t>
+            </a:r>
+          </a:p>
+          <a:p>
+            <a:pPr marL="0" indent="0">
+              <a:buNone/>
+            </a:pPr>
+            <a:r>
+              <a:rPr lang="en-US" dirty="0"/>
+              <a:t>All of these tools work together to remove friction, without compromising on security or decentralization.</a:t>
+            </a:r>
+          </a:p>
+          <a:p>
+            <a:endParaRPr lang="en-US" dirty="0"/>
+          </a:p>
+        </p:txBody>
+      </p:sp>
+    </p:spTree>
+    <p:extLst>
+      <p:ext uri="{BB962C8B-B14F-4D97-AF65-F5344CB8AC3E}">
+        <p14:creationId xmlns:p14="http://schemas.microsoft.com/office/powerpoint/2010/main" val="2614287631"/>
+      </p:ext>
+    </p:extLst>
+  </p:cSld>
+  <p:clrMapOvr>
+    <a:masterClrMapping/>
+  </p:clrMapOvr>
+</p:sld>
+</file>
+
+<file path=ppt/slides/slide11.xml><?xml version="1.0" encoding="utf-8"?>
+<p:sld xmlns:a="http://schemas.openxmlformats.org/drawingml/2006/main" xmlns:r="http://schemas.openxmlformats.org/officeDocument/2006/relationships" xmlns:p="http://schemas.openxmlformats.org/presentationml/2006/main">
+  <p:cSld>
+    <p:spTree>
+      <p:nvGrpSpPr>
+        <p:cNvPr id="1" name=""/>
+        <p:cNvGrpSpPr/>
+        <p:nvPr/>
+      </p:nvGrpSpPr>
+      <p:grpSpPr>
+        <a:xfrm>
+          <a:off x="0" y="0"/>
+          <a:ext cx="0" cy="0"/>
+          <a:chOff x="0" y="0"/>
+          <a:chExt cx="0" cy="0"/>
+        </a:xfrm>
+      </p:grpSpPr>
+      <p:sp>
+        <p:nvSpPr>
+          <p:cNvPr id="2" name="Title 1">
+            <a:extLst>
+              <a:ext uri="{FF2B5EF4-FFF2-40B4-BE49-F238E27FC236}">
                 <a16:creationId xmlns:a16="http://schemas.microsoft.com/office/drawing/2014/main" id="{D7A0496E-286F-27FE-A69B-2FB6BE7A3D9F}"/>
               </a:ext>
             </a:extLst>
@@ -8721,7 +9028,135 @@
 </p:sld>
 </file>
 
-<file path=ppt/slides/slide11.xml><?xml version="1.0" encoding="utf-8"?>
+<file path=ppt/slides/slide12.xml><?xml version="1.0" encoding="utf-8"?>
+<p:sld xmlns:a="http://schemas.openxmlformats.org/drawingml/2006/main" xmlns:r="http://schemas.openxmlformats.org/officeDocument/2006/relationships" xmlns:p="http://schemas.openxmlformats.org/presentationml/2006/main">
+  <p:cSld>
+    <p:spTree>
+      <p:nvGrpSpPr>
+        <p:cNvPr id="1" name=""/>
+        <p:cNvGrpSpPr/>
+        <p:nvPr/>
+      </p:nvGrpSpPr>
+      <p:grpSpPr>
+        <a:xfrm>
+          <a:off x="0" y="0"/>
+          <a:ext cx="0" cy="0"/>
+          <a:chOff x="0" y="0"/>
+          <a:chExt cx="0" cy="0"/>
+        </a:xfrm>
+      </p:grpSpPr>
+      <p:sp>
+        <p:nvSpPr>
+          <p:cNvPr id="2" name="Title 1">
+            <a:extLst>
+              <a:ext uri="{FF2B5EF4-FFF2-40B4-BE49-F238E27FC236}">
+                <a16:creationId xmlns:a16="http://schemas.microsoft.com/office/drawing/2014/main" id="{B51F67BA-24DF-EAE5-0176-15B72904F424}"/>
+              </a:ext>
+            </a:extLst>
+          </p:cNvPr>
+          <p:cNvSpPr>
+            <a:spLocks noGrp="1"/>
+          </p:cNvSpPr>
+          <p:nvPr>
+            <p:ph type="title"/>
+          </p:nvPr>
+        </p:nvSpPr>
+        <p:spPr/>
+        <p:txBody>
+          <a:bodyPr/>
+          <a:lstStyle/>
+          <a:p>
+            <a:endParaRPr lang="en-US"/>
+          </a:p>
+        </p:txBody>
+      </p:sp>
+      <p:sp>
+        <p:nvSpPr>
+          <p:cNvPr id="3" name="Content Placeholder 2">
+            <a:extLst>
+              <a:ext uri="{FF2B5EF4-FFF2-40B4-BE49-F238E27FC236}">
+                <a16:creationId xmlns:a16="http://schemas.microsoft.com/office/drawing/2014/main" id="{6B4AAA8F-EDFC-7CF3-1AF4-61655AFE7EA1}"/>
+              </a:ext>
+            </a:extLst>
+          </p:cNvPr>
+          <p:cNvSpPr>
+            <a:spLocks noGrp="1"/>
+          </p:cNvSpPr>
+          <p:nvPr>
+            <p:ph idx="1"/>
+          </p:nvPr>
+        </p:nvSpPr>
+        <p:spPr/>
+        <p:txBody>
+          <a:bodyPr>
+            <a:normAutofit/>
+          </a:bodyPr>
+          <a:lstStyle/>
+          <a:p>
+            <a:r>
+              <a:rPr lang="en-US" dirty="0"/>
+              <a:t>Now we will demo rebalance technic</a:t>
+            </a:r>
+          </a:p>
+          <a:p>
+            <a:r>
+              <a:rPr lang="en-US" dirty="0"/>
+              <a:t>In a multi-chain system like </a:t>
+            </a:r>
+            <a:r>
+              <a:rPr lang="en-US" dirty="0" err="1"/>
+              <a:t>IntentPay</a:t>
+            </a:r>
+            <a:r>
+              <a:rPr lang="en-US" dirty="0"/>
+              <a:t>, we hold USDC across chains like Ethereum, Base, and </a:t>
+            </a:r>
+            <a:r>
+              <a:rPr lang="en-US" dirty="0" err="1"/>
+              <a:t>Arbitrum</a:t>
+            </a:r>
+            <a:r>
+              <a:rPr lang="en-US" dirty="0"/>
+              <a:t>.</a:t>
+            </a:r>
+            <a:br>
+              <a:rPr lang="en-US" dirty="0"/>
+            </a:br>
+            <a:r>
+              <a:rPr lang="en-US" dirty="0"/>
+              <a:t>But user demand varies — one chain may get heavy usage while another sits idle.</a:t>
+            </a:r>
+            <a:br>
+              <a:rPr lang="en-US" dirty="0"/>
+            </a:br>
+            <a:r>
+              <a:rPr lang="en-US" dirty="0"/>
+              <a:t>Sometimes, 1inch selects a different chain for the best swap route.</a:t>
+            </a:r>
+            <a:br>
+              <a:rPr lang="en-US" dirty="0"/>
+            </a:br>
+            <a:r>
+              <a:rPr lang="en-US" dirty="0"/>
+              <a:t>To ensure smooth execution, we rebalance USDC across chains using CCTP, so every chain has enough liquidity when needed.</a:t>
+            </a:r>
+          </a:p>
+        </p:txBody>
+      </p:sp>
+    </p:spTree>
+    <p:extLst>
+      <p:ext uri="{BB962C8B-B14F-4D97-AF65-F5344CB8AC3E}">
+        <p14:creationId xmlns:p14="http://schemas.microsoft.com/office/powerpoint/2010/main" val="3859667125"/>
+      </p:ext>
+    </p:extLst>
+  </p:cSld>
+  <p:clrMapOvr>
+    <a:masterClrMapping/>
+  </p:clrMapOvr>
+</p:sld>
+</file>
+
+<file path=ppt/slides/slide13.xml><?xml version="1.0" encoding="utf-8"?>
 <p:sld xmlns:a="http://schemas.openxmlformats.org/drawingml/2006/main" xmlns:r="http://schemas.openxmlformats.org/officeDocument/2006/relationships" xmlns:p="http://schemas.openxmlformats.org/presentationml/2006/main" show="0">
   <p:cSld>
     <p:bg>
@@ -12153,7 +12588,7 @@
 </p:sld>
 </file>
 
-<file path=ppt/slides/slide12.xml><?xml version="1.0" encoding="utf-8"?>
+<file path=ppt/slides/slide14.xml><?xml version="1.0" encoding="utf-8"?>
 <p:sld xmlns:a="http://schemas.openxmlformats.org/drawingml/2006/main" xmlns:r="http://schemas.openxmlformats.org/officeDocument/2006/relationships" xmlns:p="http://schemas.openxmlformats.org/presentationml/2006/main" show="0">
   <p:cSld>
     <p:bg>
@@ -15044,7 +15479,7 @@
 </p:sld>
 </file>
 
-<file path=ppt/slides/slide13.xml><?xml version="1.0" encoding="utf-8"?>
+<file path=ppt/slides/slide15.xml><?xml version="1.0" encoding="utf-8"?>
 <p:sld xmlns:a="http://schemas.openxmlformats.org/drawingml/2006/main" xmlns:r="http://schemas.openxmlformats.org/officeDocument/2006/relationships" xmlns:p="http://schemas.openxmlformats.org/presentationml/2006/main" show="0">
   <p:cSld>
     <p:bg>
@@ -17903,7 +18338,7 @@
 </p:sld>
 </file>
 
-<file path=ppt/slides/slide14.xml><?xml version="1.0" encoding="utf-8"?>
+<file path=ppt/slides/slide16.xml><?xml version="1.0" encoding="utf-8"?>
 <p:sld xmlns:a="http://schemas.openxmlformats.org/drawingml/2006/main" xmlns:r="http://schemas.openxmlformats.org/officeDocument/2006/relationships" xmlns:p="http://schemas.openxmlformats.org/presentationml/2006/main" show="0">
   <p:cSld>
     <p:spTree>
@@ -17986,7 +18421,7 @@
 </p:sld>
 </file>
 
-<file path=ppt/slides/slide15.xml><?xml version="1.0" encoding="utf-8"?>
+<file path=ppt/slides/slide17.xml><?xml version="1.0" encoding="utf-8"?>
 <p:sld xmlns:a="http://schemas.openxmlformats.org/drawingml/2006/main" xmlns:r="http://schemas.openxmlformats.org/officeDocument/2006/relationships" xmlns:p="http://schemas.openxmlformats.org/presentationml/2006/main" show="0">
   <p:cSld>
     <p:spTree>
@@ -18129,7 +18564,7 @@
 </p:sld>
 </file>
 
-<file path=ppt/slides/slide16.xml><?xml version="1.0" encoding="utf-8"?>
+<file path=ppt/slides/slide18.xml><?xml version="1.0" encoding="utf-8"?>
 <p:sld xmlns:a="http://schemas.openxmlformats.org/drawingml/2006/main" xmlns:r="http://schemas.openxmlformats.org/officeDocument/2006/relationships" xmlns:p="http://schemas.openxmlformats.org/presentationml/2006/main" show="0">
   <p:cSld>
     <p:spTree>
@@ -18275,7 +18710,7 @@
 </p:sld>
 </file>
 
-<file path=ppt/slides/slide17.xml><?xml version="1.0" encoding="utf-8"?>
+<file path=ppt/slides/slide19.xml><?xml version="1.0" encoding="utf-8"?>
 <p:sld xmlns:a="http://schemas.openxmlformats.org/drawingml/2006/main" xmlns:r="http://schemas.openxmlformats.org/officeDocument/2006/relationships" xmlns:p="http://schemas.openxmlformats.org/presentationml/2006/main" show="0">
   <p:cSld>
     <p:spTree>
@@ -18493,286 +18928,6 @@
     <p:extLst>
       <p:ext uri="{BB962C8B-B14F-4D97-AF65-F5344CB8AC3E}">
         <p14:creationId xmlns:p14="http://schemas.microsoft.com/office/powerpoint/2010/main" val="2566639648"/>
-      </p:ext>
-    </p:extLst>
-  </p:cSld>
-  <p:clrMapOvr>
-    <a:masterClrMapping/>
-  </p:clrMapOvr>
-</p:sld>
-</file>
-
-<file path=ppt/slides/slide18.xml><?xml version="1.0" encoding="utf-8"?>
-<p:sld xmlns:a="http://schemas.openxmlformats.org/drawingml/2006/main" xmlns:r="http://schemas.openxmlformats.org/officeDocument/2006/relationships" xmlns:p="http://schemas.openxmlformats.org/presentationml/2006/main" show="0">
-  <p:cSld>
-    <p:spTree>
-      <p:nvGrpSpPr>
-        <p:cNvPr id="1" name=""/>
-        <p:cNvGrpSpPr/>
-        <p:nvPr/>
-      </p:nvGrpSpPr>
-      <p:grpSpPr>
-        <a:xfrm>
-          <a:off x="0" y="0"/>
-          <a:ext cx="0" cy="0"/>
-          <a:chOff x="0" y="0"/>
-          <a:chExt cx="0" cy="0"/>
-        </a:xfrm>
-      </p:grpSpPr>
-      <p:sp>
-        <p:nvSpPr>
-          <p:cNvPr id="2" name="Title 1">
-            <a:extLst>
-              <a:ext uri="{FF2B5EF4-FFF2-40B4-BE49-F238E27FC236}">
-                <a16:creationId xmlns:a16="http://schemas.microsoft.com/office/drawing/2014/main" id="{7E69669C-36C1-C722-CC42-91D38B87710A}"/>
-              </a:ext>
-            </a:extLst>
-          </p:cNvPr>
-          <p:cNvSpPr>
-            <a:spLocks noGrp="1"/>
-          </p:cNvSpPr>
-          <p:nvPr>
-            <p:ph type="title"/>
-          </p:nvPr>
-        </p:nvSpPr>
-        <p:spPr/>
-        <p:txBody>
-          <a:bodyPr/>
-          <a:lstStyle/>
-          <a:p>
-            <a:r>
-              <a:rPr lang="en-US" dirty="0"/>
-              <a:t>Circle Modular Wallet</a:t>
-            </a:r>
-          </a:p>
-        </p:txBody>
-      </p:sp>
-      <p:sp>
-        <p:nvSpPr>
-          <p:cNvPr id="3" name="Content Placeholder 2">
-            <a:extLst>
-              <a:ext uri="{FF2B5EF4-FFF2-40B4-BE49-F238E27FC236}">
-                <a16:creationId xmlns:a16="http://schemas.microsoft.com/office/drawing/2014/main" id="{157968E4-C34E-BDDB-7527-FE49DC15902B}"/>
-              </a:ext>
-            </a:extLst>
-          </p:cNvPr>
-          <p:cNvSpPr>
-            <a:spLocks noGrp="1"/>
-          </p:cNvSpPr>
-          <p:nvPr>
-            <p:ph idx="1"/>
-          </p:nvPr>
-        </p:nvSpPr>
-        <p:spPr/>
-        <p:txBody>
-          <a:bodyPr/>
-          <a:lstStyle/>
-          <a:p>
-            <a:r>
-              <a:rPr lang="zh-TW" altLang="en-US" dirty="0"/>
-              <a:t>跨鏈資產統一檢視（即使資產散落各鏈）</a:t>
-            </a:r>
-            <a:endParaRPr lang="en-US" altLang="zh-TW" dirty="0"/>
-          </a:p>
-          <a:p>
-            <a:r>
-              <a:rPr lang="zh-TW" altLang="en-US" dirty="0"/>
-              <a:t>可與 </a:t>
-            </a:r>
-            <a:r>
-              <a:rPr lang="en-US" altLang="zh-TW" dirty="0"/>
-              <a:t>World ID </a:t>
-            </a:r>
-            <a:r>
-              <a:rPr lang="zh-TW" altLang="en-US" dirty="0"/>
-              <a:t>綁定實名／人類身份，提升安全與信任</a:t>
-            </a:r>
-            <a:endParaRPr lang="en-US" altLang="zh-TW" dirty="0"/>
-          </a:p>
-          <a:p>
-            <a:r>
-              <a:rPr lang="zh-TW" altLang="en-US" dirty="0"/>
-              <a:t>這讓用戶不再需要記住多條鏈的私鑰、助記詞，也不怕資產遺失或遺忘</a:t>
-            </a:r>
-            <a:endParaRPr lang="en-US" altLang="zh-TW" dirty="0"/>
-          </a:p>
-          <a:p>
-            <a:r>
-              <a:rPr lang="en-US" dirty="0"/>
-              <a:t>Intent Wallet</a:t>
-            </a:r>
-          </a:p>
-        </p:txBody>
-      </p:sp>
-    </p:spTree>
-    <p:extLst>
-      <p:ext uri="{BB962C8B-B14F-4D97-AF65-F5344CB8AC3E}">
-        <p14:creationId xmlns:p14="http://schemas.microsoft.com/office/powerpoint/2010/main" val="1736227722"/>
-      </p:ext>
-    </p:extLst>
-  </p:cSld>
-  <p:clrMapOvr>
-    <a:masterClrMapping/>
-  </p:clrMapOvr>
-</p:sld>
-</file>
-
-<file path=ppt/slides/slide19.xml><?xml version="1.0" encoding="utf-8"?>
-<p:sld xmlns:a="http://schemas.openxmlformats.org/drawingml/2006/main" xmlns:r="http://schemas.openxmlformats.org/officeDocument/2006/relationships" xmlns:p="http://schemas.openxmlformats.org/presentationml/2006/main" show="0">
-  <p:cSld>
-    <p:spTree>
-      <p:nvGrpSpPr>
-        <p:cNvPr id="1" name=""/>
-        <p:cNvGrpSpPr/>
-        <p:nvPr/>
-      </p:nvGrpSpPr>
-      <p:grpSpPr>
-        <a:xfrm>
-          <a:off x="0" y="0"/>
-          <a:ext cx="0" cy="0"/>
-          <a:chOff x="0" y="0"/>
-          <a:chExt cx="0" cy="0"/>
-        </a:xfrm>
-      </p:grpSpPr>
-      <p:sp>
-        <p:nvSpPr>
-          <p:cNvPr id="2" name="Title 1">
-            <a:extLst>
-              <a:ext uri="{FF2B5EF4-FFF2-40B4-BE49-F238E27FC236}">
-                <a16:creationId xmlns:a16="http://schemas.microsoft.com/office/drawing/2014/main" id="{0A4BEA6D-1067-06CB-4E23-36A094758CCE}"/>
-              </a:ext>
-            </a:extLst>
-          </p:cNvPr>
-          <p:cNvSpPr>
-            <a:spLocks noGrp="1"/>
-          </p:cNvSpPr>
-          <p:nvPr>
-            <p:ph type="title"/>
-          </p:nvPr>
-        </p:nvSpPr>
-        <p:spPr/>
-        <p:txBody>
-          <a:bodyPr/>
-          <a:lstStyle/>
-          <a:p>
-            <a:endParaRPr lang="en-US"/>
-          </a:p>
-        </p:txBody>
-      </p:sp>
-      <p:sp>
-        <p:nvSpPr>
-          <p:cNvPr id="3" name="Content Placeholder 2">
-            <a:extLst>
-              <a:ext uri="{FF2B5EF4-FFF2-40B4-BE49-F238E27FC236}">
-                <a16:creationId xmlns:a16="http://schemas.microsoft.com/office/drawing/2014/main" id="{BFAA4454-AED7-0AA6-A52E-4C9FB06B50CC}"/>
-              </a:ext>
-            </a:extLst>
-          </p:cNvPr>
-          <p:cNvSpPr>
-            <a:spLocks noGrp="1"/>
-          </p:cNvSpPr>
-          <p:nvPr>
-            <p:ph idx="1"/>
-          </p:nvPr>
-        </p:nvSpPr>
-        <p:spPr/>
-        <p:txBody>
-          <a:bodyPr/>
-          <a:lstStyle/>
-          <a:p>
-            <a:r>
-              <a:rPr lang="zh-TW" altLang="en-US" dirty="0"/>
-              <a:t>用戶零感知、多鏈任意支付	不懂鏈、不懂幣也能完成支付</a:t>
-            </a:r>
-            <a:endParaRPr lang="en-US" altLang="zh-TW" dirty="0"/>
-          </a:p>
-          <a:p>
-            <a:r>
-              <a:rPr lang="en-US" altLang="zh-TW" dirty="0"/>
-              <a:t>Intent </a:t>
-            </a:r>
-            <a:r>
-              <a:rPr lang="zh-TW" altLang="en-US" dirty="0"/>
-              <a:t>撮合 </a:t>
-            </a:r>
-            <a:r>
-              <a:rPr lang="en-US" altLang="zh-TW" dirty="0"/>
-              <a:t>+ </a:t>
-            </a:r>
-            <a:r>
-              <a:rPr lang="zh-TW" altLang="en-US" dirty="0"/>
-              <a:t>最佳價格執行</a:t>
-            </a:r>
-            <a:r>
-              <a:rPr lang="en-US" altLang="zh-TW" dirty="0"/>
-              <a:t>: </a:t>
-            </a:r>
-            <a:r>
-              <a:rPr lang="zh-TW" altLang="en-US" dirty="0"/>
-              <a:t>結合 </a:t>
-            </a:r>
-            <a:r>
-              <a:rPr lang="en-US" altLang="zh-TW" dirty="0"/>
-              <a:t>1inch + CCTP </a:t>
-            </a:r>
-            <a:r>
-              <a:rPr lang="zh-TW" altLang="en-US" dirty="0"/>
-              <a:t>的路由與效率</a:t>
-            </a:r>
-            <a:endParaRPr lang="en-US" altLang="zh-TW" dirty="0"/>
-          </a:p>
-          <a:p>
-            <a:r>
-              <a:rPr lang="zh-TW" altLang="en-US" dirty="0"/>
-              <a:t>資產由 </a:t>
-            </a:r>
-            <a:r>
-              <a:rPr lang="en-US" altLang="zh-TW" dirty="0"/>
-              <a:t>Modular Wallet </a:t>
-            </a:r>
-            <a:r>
-              <a:rPr lang="zh-TW" altLang="en-US" dirty="0"/>
-              <a:t>管理</a:t>
-            </a:r>
-            <a:r>
-              <a:rPr lang="en-US" altLang="zh-TW" dirty="0"/>
-              <a:t>: </a:t>
-            </a:r>
-            <a:r>
-              <a:rPr lang="zh-TW" altLang="en-US" dirty="0"/>
-              <a:t>提供安全、可擴展、可與 </a:t>
-            </a:r>
-            <a:r>
-              <a:rPr lang="en-US" altLang="zh-TW" dirty="0"/>
-              <a:t>World ID </a:t>
-            </a:r>
-            <a:r>
-              <a:rPr lang="zh-TW" altLang="en-US" dirty="0"/>
-              <a:t>整合的錢包方案</a:t>
-            </a:r>
-            <a:endParaRPr lang="en-US" altLang="zh-TW" dirty="0"/>
-          </a:p>
-          <a:p>
-            <a:r>
-              <a:rPr lang="zh-TW" altLang="en-US" dirty="0"/>
-              <a:t>商業模式</a:t>
-            </a:r>
-            <a:r>
-              <a:rPr lang="en-US" altLang="zh-TW" dirty="0"/>
-              <a:t>: Intent </a:t>
-            </a:r>
-            <a:r>
-              <a:rPr lang="zh-TW" altLang="en-US" dirty="0"/>
-              <a:t>撮合收取低額手續費，按交易量穩定營收</a:t>
-            </a:r>
-            <a:endParaRPr lang="en-US" dirty="0"/>
-          </a:p>
-        </p:txBody>
-      </p:sp>
-    </p:spTree>
-    <p:extLst>
-      <p:ext uri="{BB962C8B-B14F-4D97-AF65-F5344CB8AC3E}">
-        <p14:creationId xmlns:p14="http://schemas.microsoft.com/office/powerpoint/2010/main" val="3048276935"/>
       </p:ext>
     </p:extLst>
   </p:cSld>
@@ -19379,6 +19534,286 @@
 </p:sld>
 </file>
 
+<file path=ppt/slides/slide20.xml><?xml version="1.0" encoding="utf-8"?>
+<p:sld xmlns:a="http://schemas.openxmlformats.org/drawingml/2006/main" xmlns:r="http://schemas.openxmlformats.org/officeDocument/2006/relationships" xmlns:p="http://schemas.openxmlformats.org/presentationml/2006/main" show="0">
+  <p:cSld>
+    <p:spTree>
+      <p:nvGrpSpPr>
+        <p:cNvPr id="1" name=""/>
+        <p:cNvGrpSpPr/>
+        <p:nvPr/>
+      </p:nvGrpSpPr>
+      <p:grpSpPr>
+        <a:xfrm>
+          <a:off x="0" y="0"/>
+          <a:ext cx="0" cy="0"/>
+          <a:chOff x="0" y="0"/>
+          <a:chExt cx="0" cy="0"/>
+        </a:xfrm>
+      </p:grpSpPr>
+      <p:sp>
+        <p:nvSpPr>
+          <p:cNvPr id="2" name="Title 1">
+            <a:extLst>
+              <a:ext uri="{FF2B5EF4-FFF2-40B4-BE49-F238E27FC236}">
+                <a16:creationId xmlns:a16="http://schemas.microsoft.com/office/drawing/2014/main" id="{7E69669C-36C1-C722-CC42-91D38B87710A}"/>
+              </a:ext>
+            </a:extLst>
+          </p:cNvPr>
+          <p:cNvSpPr>
+            <a:spLocks noGrp="1"/>
+          </p:cNvSpPr>
+          <p:nvPr>
+            <p:ph type="title"/>
+          </p:nvPr>
+        </p:nvSpPr>
+        <p:spPr/>
+        <p:txBody>
+          <a:bodyPr/>
+          <a:lstStyle/>
+          <a:p>
+            <a:r>
+              <a:rPr lang="en-US" dirty="0"/>
+              <a:t>Circle Modular Wallet</a:t>
+            </a:r>
+          </a:p>
+        </p:txBody>
+      </p:sp>
+      <p:sp>
+        <p:nvSpPr>
+          <p:cNvPr id="3" name="Content Placeholder 2">
+            <a:extLst>
+              <a:ext uri="{FF2B5EF4-FFF2-40B4-BE49-F238E27FC236}">
+                <a16:creationId xmlns:a16="http://schemas.microsoft.com/office/drawing/2014/main" id="{157968E4-C34E-BDDB-7527-FE49DC15902B}"/>
+              </a:ext>
+            </a:extLst>
+          </p:cNvPr>
+          <p:cNvSpPr>
+            <a:spLocks noGrp="1"/>
+          </p:cNvSpPr>
+          <p:nvPr>
+            <p:ph idx="1"/>
+          </p:nvPr>
+        </p:nvSpPr>
+        <p:spPr/>
+        <p:txBody>
+          <a:bodyPr/>
+          <a:lstStyle/>
+          <a:p>
+            <a:r>
+              <a:rPr lang="zh-TW" altLang="en-US" dirty="0"/>
+              <a:t>跨鏈資產統一檢視（即使資產散落各鏈）</a:t>
+            </a:r>
+            <a:endParaRPr lang="en-US" altLang="zh-TW" dirty="0"/>
+          </a:p>
+          <a:p>
+            <a:r>
+              <a:rPr lang="zh-TW" altLang="en-US" dirty="0"/>
+              <a:t>可與 </a:t>
+            </a:r>
+            <a:r>
+              <a:rPr lang="en-US" altLang="zh-TW" dirty="0"/>
+              <a:t>World ID </a:t>
+            </a:r>
+            <a:r>
+              <a:rPr lang="zh-TW" altLang="en-US" dirty="0"/>
+              <a:t>綁定實名／人類身份，提升安全與信任</a:t>
+            </a:r>
+            <a:endParaRPr lang="en-US" altLang="zh-TW" dirty="0"/>
+          </a:p>
+          <a:p>
+            <a:r>
+              <a:rPr lang="zh-TW" altLang="en-US" dirty="0"/>
+              <a:t>這讓用戶不再需要記住多條鏈的私鑰、助記詞，也不怕資產遺失或遺忘</a:t>
+            </a:r>
+            <a:endParaRPr lang="en-US" altLang="zh-TW" dirty="0"/>
+          </a:p>
+          <a:p>
+            <a:r>
+              <a:rPr lang="en-US" dirty="0"/>
+              <a:t>Intent Wallet</a:t>
+            </a:r>
+          </a:p>
+        </p:txBody>
+      </p:sp>
+    </p:spTree>
+    <p:extLst>
+      <p:ext uri="{BB962C8B-B14F-4D97-AF65-F5344CB8AC3E}">
+        <p14:creationId xmlns:p14="http://schemas.microsoft.com/office/powerpoint/2010/main" val="1736227722"/>
+      </p:ext>
+    </p:extLst>
+  </p:cSld>
+  <p:clrMapOvr>
+    <a:masterClrMapping/>
+  </p:clrMapOvr>
+</p:sld>
+</file>
+
+<file path=ppt/slides/slide21.xml><?xml version="1.0" encoding="utf-8"?>
+<p:sld xmlns:a="http://schemas.openxmlformats.org/drawingml/2006/main" xmlns:r="http://schemas.openxmlformats.org/officeDocument/2006/relationships" xmlns:p="http://schemas.openxmlformats.org/presentationml/2006/main" show="0">
+  <p:cSld>
+    <p:spTree>
+      <p:nvGrpSpPr>
+        <p:cNvPr id="1" name=""/>
+        <p:cNvGrpSpPr/>
+        <p:nvPr/>
+      </p:nvGrpSpPr>
+      <p:grpSpPr>
+        <a:xfrm>
+          <a:off x="0" y="0"/>
+          <a:ext cx="0" cy="0"/>
+          <a:chOff x="0" y="0"/>
+          <a:chExt cx="0" cy="0"/>
+        </a:xfrm>
+      </p:grpSpPr>
+      <p:sp>
+        <p:nvSpPr>
+          <p:cNvPr id="2" name="Title 1">
+            <a:extLst>
+              <a:ext uri="{FF2B5EF4-FFF2-40B4-BE49-F238E27FC236}">
+                <a16:creationId xmlns:a16="http://schemas.microsoft.com/office/drawing/2014/main" id="{0A4BEA6D-1067-06CB-4E23-36A094758CCE}"/>
+              </a:ext>
+            </a:extLst>
+          </p:cNvPr>
+          <p:cNvSpPr>
+            <a:spLocks noGrp="1"/>
+          </p:cNvSpPr>
+          <p:nvPr>
+            <p:ph type="title"/>
+          </p:nvPr>
+        </p:nvSpPr>
+        <p:spPr/>
+        <p:txBody>
+          <a:bodyPr/>
+          <a:lstStyle/>
+          <a:p>
+            <a:endParaRPr lang="en-US"/>
+          </a:p>
+        </p:txBody>
+      </p:sp>
+      <p:sp>
+        <p:nvSpPr>
+          <p:cNvPr id="3" name="Content Placeholder 2">
+            <a:extLst>
+              <a:ext uri="{FF2B5EF4-FFF2-40B4-BE49-F238E27FC236}">
+                <a16:creationId xmlns:a16="http://schemas.microsoft.com/office/drawing/2014/main" id="{BFAA4454-AED7-0AA6-A52E-4C9FB06B50CC}"/>
+              </a:ext>
+            </a:extLst>
+          </p:cNvPr>
+          <p:cNvSpPr>
+            <a:spLocks noGrp="1"/>
+          </p:cNvSpPr>
+          <p:nvPr>
+            <p:ph idx="1"/>
+          </p:nvPr>
+        </p:nvSpPr>
+        <p:spPr/>
+        <p:txBody>
+          <a:bodyPr/>
+          <a:lstStyle/>
+          <a:p>
+            <a:r>
+              <a:rPr lang="zh-TW" altLang="en-US" dirty="0"/>
+              <a:t>用戶零感知、多鏈任意支付	不懂鏈、不懂幣也能完成支付</a:t>
+            </a:r>
+            <a:endParaRPr lang="en-US" altLang="zh-TW" dirty="0"/>
+          </a:p>
+          <a:p>
+            <a:r>
+              <a:rPr lang="en-US" altLang="zh-TW" dirty="0"/>
+              <a:t>Intent </a:t>
+            </a:r>
+            <a:r>
+              <a:rPr lang="zh-TW" altLang="en-US" dirty="0"/>
+              <a:t>撮合 </a:t>
+            </a:r>
+            <a:r>
+              <a:rPr lang="en-US" altLang="zh-TW" dirty="0"/>
+              <a:t>+ </a:t>
+            </a:r>
+            <a:r>
+              <a:rPr lang="zh-TW" altLang="en-US" dirty="0"/>
+              <a:t>最佳價格執行</a:t>
+            </a:r>
+            <a:r>
+              <a:rPr lang="en-US" altLang="zh-TW" dirty="0"/>
+              <a:t>: </a:t>
+            </a:r>
+            <a:r>
+              <a:rPr lang="zh-TW" altLang="en-US" dirty="0"/>
+              <a:t>結合 </a:t>
+            </a:r>
+            <a:r>
+              <a:rPr lang="en-US" altLang="zh-TW" dirty="0"/>
+              <a:t>1inch + CCTP </a:t>
+            </a:r>
+            <a:r>
+              <a:rPr lang="zh-TW" altLang="en-US" dirty="0"/>
+              <a:t>的路由與效率</a:t>
+            </a:r>
+            <a:endParaRPr lang="en-US" altLang="zh-TW" dirty="0"/>
+          </a:p>
+          <a:p>
+            <a:r>
+              <a:rPr lang="zh-TW" altLang="en-US" dirty="0"/>
+              <a:t>資產由 </a:t>
+            </a:r>
+            <a:r>
+              <a:rPr lang="en-US" altLang="zh-TW" dirty="0"/>
+              <a:t>Modular Wallet </a:t>
+            </a:r>
+            <a:r>
+              <a:rPr lang="zh-TW" altLang="en-US" dirty="0"/>
+              <a:t>管理</a:t>
+            </a:r>
+            <a:r>
+              <a:rPr lang="en-US" altLang="zh-TW" dirty="0"/>
+              <a:t>: </a:t>
+            </a:r>
+            <a:r>
+              <a:rPr lang="zh-TW" altLang="en-US" dirty="0"/>
+              <a:t>提供安全、可擴展、可與 </a:t>
+            </a:r>
+            <a:r>
+              <a:rPr lang="en-US" altLang="zh-TW" dirty="0"/>
+              <a:t>World ID </a:t>
+            </a:r>
+            <a:r>
+              <a:rPr lang="zh-TW" altLang="en-US" dirty="0"/>
+              <a:t>整合的錢包方案</a:t>
+            </a:r>
+            <a:endParaRPr lang="en-US" altLang="zh-TW" dirty="0"/>
+          </a:p>
+          <a:p>
+            <a:r>
+              <a:rPr lang="zh-TW" altLang="en-US" dirty="0"/>
+              <a:t>商業模式</a:t>
+            </a:r>
+            <a:r>
+              <a:rPr lang="en-US" altLang="zh-TW" dirty="0"/>
+              <a:t>: Intent </a:t>
+            </a:r>
+            <a:r>
+              <a:rPr lang="zh-TW" altLang="en-US" dirty="0"/>
+              <a:t>撮合收取低額手續費，按交易量穩定營收</a:t>
+            </a:r>
+            <a:endParaRPr lang="en-US" dirty="0"/>
+          </a:p>
+        </p:txBody>
+      </p:sp>
+    </p:spTree>
+    <p:extLst>
+      <p:ext uri="{BB962C8B-B14F-4D97-AF65-F5344CB8AC3E}">
+        <p14:creationId xmlns:p14="http://schemas.microsoft.com/office/powerpoint/2010/main" val="3048276935"/>
+      </p:ext>
+    </p:extLst>
+  </p:cSld>
+  <p:clrMapOvr>
+    <a:masterClrMapping/>
+  </p:clrMapOvr>
+</p:sld>
+</file>
+
 <file path=ppt/slides/slide3.xml><?xml version="1.0" encoding="utf-8"?>
 <p:sld xmlns:a="http://schemas.openxmlformats.org/drawingml/2006/main" xmlns:r="http://schemas.openxmlformats.org/officeDocument/2006/relationships" xmlns:p="http://schemas.openxmlformats.org/presentationml/2006/main">
   <p:cSld>
@@ -20438,7 +20873,7 @@
         </p:nvSpPr>
         <p:spPr>
           <a:xfrm>
-            <a:off x="1868947" y="302930"/>
+            <a:off x="408929" y="267616"/>
             <a:ext cx="4509730" cy="775845"/>
           </a:xfrm>
         </p:spPr>
@@ -22869,7 +23304,7 @@
         </p:nvSpPr>
         <p:spPr>
           <a:xfrm>
-            <a:off x="786355" y="1360647"/>
+            <a:off x="4808503" y="1464327"/>
             <a:ext cx="2042651" cy="959728"/>
           </a:xfrm>
           <a:prstGeom prst="roundRect">
@@ -22920,7 +23355,7 @@
         </p:nvCxnSpPr>
         <p:spPr>
           <a:xfrm>
-            <a:off x="1535535" y="2814125"/>
+            <a:off x="1888827" y="2814125"/>
             <a:ext cx="8699846" cy="0"/>
           </a:xfrm>
           <a:prstGeom prst="line">
@@ -22959,7 +23394,7 @@
         </p:nvSpPr>
         <p:spPr>
           <a:xfrm>
-            <a:off x="3280694" y="1360647"/>
+            <a:off x="2243688" y="1466586"/>
             <a:ext cx="2042651" cy="959728"/>
           </a:xfrm>
           <a:prstGeom prst="roundRect">
@@ -23064,51 +23499,6 @@
           </a:p>
         </p:txBody>
       </p:sp>
-      <p:cxnSp>
-        <p:nvCxnSpPr>
-          <p:cNvPr id="47" name="Straight Arrow Connector 46">
-            <a:extLst>
-              <a:ext uri="{FF2B5EF4-FFF2-40B4-BE49-F238E27FC236}">
-                <a16:creationId xmlns:a16="http://schemas.microsoft.com/office/drawing/2014/main" id="{320485E1-9C36-E224-DABD-95C8B472BCCB}"/>
-              </a:ext>
-            </a:extLst>
-          </p:cNvPr>
-          <p:cNvCxnSpPr>
-            <a:stCxn id="13" idx="3"/>
-            <a:endCxn id="26" idx="1"/>
-          </p:cNvCxnSpPr>
-          <p:nvPr/>
-        </p:nvCxnSpPr>
-        <p:spPr>
-          <a:xfrm>
-            <a:off x="2829006" y="1840511"/>
-            <a:ext cx="451688" cy="0"/>
-          </a:xfrm>
-          <a:prstGeom prst="straightConnector1">
-            <a:avLst/>
-          </a:prstGeom>
-          <a:ln>
-            <a:solidFill>
-              <a:schemeClr val="accent1"/>
-            </a:solidFill>
-            <a:tailEnd type="triangle"/>
-          </a:ln>
-        </p:spPr>
-        <p:style>
-          <a:lnRef idx="2">
-            <a:schemeClr val="accent1"/>
-          </a:lnRef>
-          <a:fillRef idx="0">
-            <a:schemeClr val="accent1"/>
-          </a:fillRef>
-          <a:effectRef idx="1">
-            <a:schemeClr val="accent1"/>
-          </a:effectRef>
-          <a:fontRef idx="minor">
-            <a:schemeClr val="tx1"/>
-          </a:fontRef>
-        </p:style>
-      </p:cxnSp>
       <p:sp>
         <p:nvSpPr>
           <p:cNvPr id="50" name="Rectangle: Rounded Corners 49">
@@ -23123,7 +23513,7 @@
         </p:nvSpPr>
         <p:spPr>
           <a:xfrm>
-            <a:off x="3275851" y="4972712"/>
+            <a:off x="2243688" y="4972712"/>
             <a:ext cx="2042651" cy="959728"/>
           </a:xfrm>
           <a:prstGeom prst="roundRect">
@@ -23182,9 +23572,9 @@
           <p:nvPr/>
         </p:nvCxnSpPr>
         <p:spPr>
-          <a:xfrm flipH="1">
-            <a:off x="4297177" y="2320375"/>
-            <a:ext cx="4843" cy="892225"/>
+          <a:xfrm>
+            <a:off x="3265014" y="2426314"/>
+            <a:ext cx="0" cy="786286"/>
           </a:xfrm>
           <a:prstGeom prst="straightConnector1">
             <a:avLst/>
@@ -23222,7 +23612,7 @@
         </p:nvSpPr>
         <p:spPr>
           <a:xfrm>
-            <a:off x="8461735" y="5312543"/>
+            <a:off x="7429572" y="5312543"/>
             <a:ext cx="2042651" cy="959728"/>
           </a:xfrm>
           <a:prstGeom prst="roundRect">
@@ -23271,7 +23661,7 @@
         </p:nvSpPr>
         <p:spPr>
           <a:xfrm>
-            <a:off x="5950822" y="4261391"/>
+            <a:off x="4918659" y="4261391"/>
             <a:ext cx="4741608" cy="2381863"/>
           </a:xfrm>
           <a:prstGeom prst="roundRect">
@@ -23318,7 +23708,7 @@
         </p:nvSpPr>
         <p:spPr>
           <a:xfrm>
-            <a:off x="6188641" y="5312543"/>
+            <a:off x="5156478" y="5312543"/>
             <a:ext cx="2042651" cy="959728"/>
           </a:xfrm>
           <a:prstGeom prst="roundRect">
@@ -23367,7 +23757,7 @@
         </p:nvSpPr>
         <p:spPr>
           <a:xfrm>
-            <a:off x="6904384" y="4413049"/>
+            <a:off x="5872221" y="4413049"/>
             <a:ext cx="2829400" cy="707886"/>
           </a:xfrm>
           <a:prstGeom prst="rect">
@@ -23407,7 +23797,7 @@
         </p:nvCxnSpPr>
         <p:spPr>
           <a:xfrm flipV="1">
-            <a:off x="5318502" y="5452323"/>
+            <a:off x="4286339" y="5452323"/>
             <a:ext cx="632320" cy="253"/>
           </a:xfrm>
           <a:prstGeom prst="straightConnector1">
@@ -23449,7 +23839,7 @@
         </p:nvSpPr>
         <p:spPr>
           <a:xfrm>
-            <a:off x="3275851" y="3212600"/>
+            <a:off x="2243688" y="3212600"/>
             <a:ext cx="2042651" cy="959728"/>
           </a:xfrm>
           <a:prstGeom prst="roundRect">
@@ -23505,7 +23895,7 @@
         </p:nvSpPr>
         <p:spPr>
           <a:xfrm>
-            <a:off x="4165852" y="4360103"/>
+            <a:off x="3133689" y="4360103"/>
             <a:ext cx="262649" cy="458672"/>
           </a:xfrm>
           <a:prstGeom prst="downArrow">
@@ -23537,6 +23927,140 @@
           </a:p>
         </p:txBody>
       </p:sp>
+      <p:sp>
+        <p:nvSpPr>
+          <p:cNvPr id="16" name="Rectangle: Rounded Corners 15">
+            <a:extLst>
+              <a:ext uri="{FF2B5EF4-FFF2-40B4-BE49-F238E27FC236}">
+                <a16:creationId xmlns:a16="http://schemas.microsoft.com/office/drawing/2014/main" id="{AF7CBEC4-6904-B7C2-44DF-E1D8D4443D38}"/>
+              </a:ext>
+            </a:extLst>
+          </p:cNvPr>
+          <p:cNvSpPr/>
+          <p:nvPr/>
+        </p:nvSpPr>
+        <p:spPr>
+          <a:xfrm>
+            <a:off x="7373318" y="1464327"/>
+            <a:ext cx="2042651" cy="959728"/>
+          </a:xfrm>
+          <a:prstGeom prst="roundRect">
+            <a:avLst/>
+          </a:prstGeom>
+        </p:spPr>
+        <p:style>
+          <a:lnRef idx="2">
+            <a:schemeClr val="accent1">
+              <a:shade val="15000"/>
+            </a:schemeClr>
+          </a:lnRef>
+          <a:fillRef idx="1">
+            <a:schemeClr val="accent1"/>
+          </a:fillRef>
+          <a:effectRef idx="0">
+            <a:schemeClr val="accent1"/>
+          </a:effectRef>
+          <a:fontRef idx="minor">
+            <a:schemeClr val="lt1"/>
+          </a:fontRef>
+        </p:style>
+        <p:txBody>
+          <a:bodyPr rtlCol="0" anchor="ctr"/>
+          <a:lstStyle/>
+          <a:p>
+            <a:pPr algn="ctr"/>
+            <a:r>
+              <a:rPr lang="en-US" dirty="0"/>
+              <a:t>Apple Pay</a:t>
+            </a:r>
+          </a:p>
+        </p:txBody>
+      </p:sp>
+      <p:cxnSp>
+        <p:nvCxnSpPr>
+          <p:cNvPr id="22" name="Straight Arrow Connector 21">
+            <a:extLst>
+              <a:ext uri="{FF2B5EF4-FFF2-40B4-BE49-F238E27FC236}">
+                <a16:creationId xmlns:a16="http://schemas.microsoft.com/office/drawing/2014/main" id="{48CAB3D0-9AEF-566B-0969-F96A7F036469}"/>
+              </a:ext>
+            </a:extLst>
+          </p:cNvPr>
+          <p:cNvCxnSpPr>
+            <a:stCxn id="13" idx="1"/>
+            <a:endCxn id="26" idx="3"/>
+          </p:cNvCxnSpPr>
+          <p:nvPr/>
+        </p:nvCxnSpPr>
+        <p:spPr>
+          <a:xfrm flipH="1">
+            <a:off x="4286339" y="1944191"/>
+            <a:ext cx="522164" cy="2259"/>
+          </a:xfrm>
+          <a:prstGeom prst="straightConnector1">
+            <a:avLst/>
+          </a:prstGeom>
+          <a:ln>
+            <a:tailEnd type="triangle"/>
+          </a:ln>
+        </p:spPr>
+        <p:style>
+          <a:lnRef idx="2">
+            <a:schemeClr val="accent1"/>
+          </a:lnRef>
+          <a:fillRef idx="0">
+            <a:schemeClr val="accent1"/>
+          </a:fillRef>
+          <a:effectRef idx="1">
+            <a:schemeClr val="accent1"/>
+          </a:effectRef>
+          <a:fontRef idx="minor">
+            <a:schemeClr val="tx1"/>
+          </a:fontRef>
+        </p:style>
+      </p:cxnSp>
+      <p:cxnSp>
+        <p:nvCxnSpPr>
+          <p:cNvPr id="25" name="Straight Arrow Connector 24">
+            <a:extLst>
+              <a:ext uri="{FF2B5EF4-FFF2-40B4-BE49-F238E27FC236}">
+                <a16:creationId xmlns:a16="http://schemas.microsoft.com/office/drawing/2014/main" id="{BF56E255-7356-0916-4959-00F38BCA9F3A}"/>
+              </a:ext>
+            </a:extLst>
+          </p:cNvPr>
+          <p:cNvCxnSpPr>
+            <a:cxnSpLocks/>
+            <a:stCxn id="16" idx="1"/>
+            <a:endCxn id="13" idx="3"/>
+          </p:cNvCxnSpPr>
+          <p:nvPr/>
+        </p:nvCxnSpPr>
+        <p:spPr>
+          <a:xfrm flipH="1">
+            <a:off x="6851154" y="1944191"/>
+            <a:ext cx="522164" cy="0"/>
+          </a:xfrm>
+          <a:prstGeom prst="straightConnector1">
+            <a:avLst/>
+          </a:prstGeom>
+          <a:ln>
+            <a:tailEnd type="triangle"/>
+          </a:ln>
+        </p:spPr>
+        <p:style>
+          <a:lnRef idx="2">
+            <a:schemeClr val="accent1"/>
+          </a:lnRef>
+          <a:fillRef idx="0">
+            <a:schemeClr val="accent1"/>
+          </a:fillRef>
+          <a:effectRef idx="1">
+            <a:schemeClr val="accent1"/>
+          </a:effectRef>
+          <a:fontRef idx="minor">
+            <a:schemeClr val="tx1"/>
+          </a:fontRef>
+        </p:style>
+      </p:cxnSp>
     </p:spTree>
     <p:extLst>
       <p:ext uri="{BB962C8B-B14F-4D97-AF65-F5344CB8AC3E}">
@@ -29836,12 +30360,92 @@
           <a:chExt cx="0" cy="0"/>
         </a:xfrm>
       </p:grpSpPr>
+      <p:pic>
+        <p:nvPicPr>
+          <p:cNvPr id="14" name="Picture 13" descr="A logo with a black background&#10;&#10;AI-generated content may be incorrect.">
+            <a:extLst>
+              <a:ext uri="{FF2B5EF4-FFF2-40B4-BE49-F238E27FC236}">
+                <a16:creationId xmlns:a16="http://schemas.microsoft.com/office/drawing/2014/main" id="{C441D677-C70F-95EE-6B3A-CF0AB44F4C24}"/>
+              </a:ext>
+            </a:extLst>
+          </p:cNvPr>
+          <p:cNvPicPr>
+            <a:picLocks noChangeAspect="1"/>
+          </p:cNvPicPr>
+          <p:nvPr/>
+        </p:nvPicPr>
+        <p:blipFill>
+          <a:blip r:embed="rId3">
+            <a:alphaModFix amt="85000"/>
+            <a:extLst>
+              <a:ext uri="{28A0092B-C50C-407E-A947-70E740481C1C}">
+                <a14:useLocalDpi xmlns:a14="http://schemas.microsoft.com/office/drawing/2010/main" val="0"/>
+              </a:ext>
+            </a:extLst>
+          </a:blip>
+          <a:stretch>
+            <a:fillRect/>
+          </a:stretch>
+        </p:blipFill>
+        <p:spPr>
+          <a:xfrm>
+            <a:off x="3466885" y="2276776"/>
+            <a:ext cx="3676054" cy="3676054"/>
+          </a:xfrm>
+          <a:prstGeom prst="rect">
+            <a:avLst/>
+          </a:prstGeom>
+          <a:effectLst>
+            <a:outerShdw blurRad="50800" dist="50800" dir="5400000" algn="ctr" rotWithShape="0">
+              <a:srgbClr val="000000">
+                <a:alpha val="20000"/>
+              </a:srgbClr>
+            </a:outerShdw>
+          </a:effectLst>
+        </p:spPr>
+      </p:pic>
+      <p:pic>
+        <p:nvPicPr>
+          <p:cNvPr id="13" name="Picture 12" descr="A logo of a unicorn&#10;&#10;AI-generated content may be incorrect.">
+            <a:extLst>
+              <a:ext uri="{FF2B5EF4-FFF2-40B4-BE49-F238E27FC236}">
+                <a16:creationId xmlns:a16="http://schemas.microsoft.com/office/drawing/2014/main" id="{027A2AF7-BC6D-3673-D0BB-1FF4CC845F9C}"/>
+              </a:ext>
+            </a:extLst>
+          </p:cNvPr>
+          <p:cNvPicPr>
+            <a:picLocks noChangeAspect="1"/>
+          </p:cNvPicPr>
+          <p:nvPr/>
+        </p:nvPicPr>
+        <p:blipFill>
+          <a:blip r:embed="rId4">
+            <a:extLst>
+              <a:ext uri="{28A0092B-C50C-407E-A947-70E740481C1C}">
+                <a14:useLocalDpi xmlns:a14="http://schemas.microsoft.com/office/drawing/2010/main" val="0"/>
+              </a:ext>
+            </a:extLst>
+          </a:blip>
+          <a:stretch>
+            <a:fillRect/>
+          </a:stretch>
+        </p:blipFill>
+        <p:spPr>
+          <a:xfrm>
+            <a:off x="9944807" y="1435818"/>
+            <a:ext cx="1778271" cy="1778271"/>
+          </a:xfrm>
+          <a:prstGeom prst="rect">
+            <a:avLst/>
+          </a:prstGeom>
+        </p:spPr>
+      </p:pic>
       <p:sp>
         <p:nvSpPr>
           <p:cNvPr id="2" name="Title 1">
             <a:extLst>
               <a:ext uri="{FF2B5EF4-FFF2-40B4-BE49-F238E27FC236}">
-                <a16:creationId xmlns:a16="http://schemas.microsoft.com/office/drawing/2014/main" id="{B8837F5D-7861-3975-1FB1-A45E95906B81}"/>
+                <a16:creationId xmlns:a16="http://schemas.microsoft.com/office/drawing/2014/main" id="{F08A6C5A-D97D-8EE4-3893-D9B2A09A1F9C}"/>
               </a:ext>
             </a:extLst>
           </p:cNvPr>
@@ -29858,57 +30462,369 @@
           <a:lstStyle/>
           <a:p>
             <a:r>
-              <a:rPr lang="en-US" dirty="0"/>
-              <a:t>Q1: What inspired your project?</a:t>
-            </a:r>
+              <a:rPr lang="en-US" altLang="zh-TW" dirty="0"/>
+              <a:t>Re-Balancing</a:t>
+            </a:r>
+            <a:endParaRPr lang="en-US" dirty="0"/>
           </a:p>
         </p:txBody>
       </p:sp>
       <p:sp>
         <p:nvSpPr>
-          <p:cNvPr id="3" name="Content Placeholder 2">
+          <p:cNvPr id="4" name="Rectangle: Rounded Corners 3">
             <a:extLst>
               <a:ext uri="{FF2B5EF4-FFF2-40B4-BE49-F238E27FC236}">
-                <a16:creationId xmlns:a16="http://schemas.microsoft.com/office/drawing/2014/main" id="{80BD6361-DECA-F3B2-9158-5B8DEAD7ACA1}"/>
+                <a16:creationId xmlns:a16="http://schemas.microsoft.com/office/drawing/2014/main" id="{92EAF59E-51B4-6AD2-82AF-C35AF24BD895}"/>
               </a:ext>
             </a:extLst>
           </p:cNvPr>
-          <p:cNvSpPr>
-            <a:spLocks noGrp="1"/>
-          </p:cNvSpPr>
-          <p:nvPr>
-            <p:ph idx="1"/>
-          </p:nvPr>
+          <p:cNvSpPr/>
+          <p:nvPr/>
         </p:nvSpPr>
-        <p:spPr/>
+        <p:spPr>
+          <a:xfrm>
+            <a:off x="4613349" y="2276776"/>
+            <a:ext cx="1383126" cy="759666"/>
+          </a:xfrm>
+          <a:prstGeom prst="roundRect">
+            <a:avLst/>
+          </a:prstGeom>
+        </p:spPr>
+        <p:style>
+          <a:lnRef idx="2">
+            <a:schemeClr val="accent1">
+              <a:shade val="15000"/>
+            </a:schemeClr>
+          </a:lnRef>
+          <a:fillRef idx="1">
+            <a:schemeClr val="accent1"/>
+          </a:fillRef>
+          <a:effectRef idx="0">
+            <a:schemeClr val="accent1"/>
+          </a:effectRef>
+          <a:fontRef idx="minor">
+            <a:schemeClr val="lt1"/>
+          </a:fontRef>
+        </p:style>
         <p:txBody>
-          <a:bodyPr/>
+          <a:bodyPr rtlCol="0" anchor="ctr"/>
           <a:lstStyle/>
           <a:p>
-            <a:r>
-              <a:rPr lang="en-US" dirty="0"/>
-              <a:t>We started with a simple observation:</a:t>
+            <a:pPr algn="ctr"/>
+            <a:r>
+              <a:rPr lang="en-US" sz="2400" dirty="0"/>
+              <a:t>Base</a:t>
             </a:r>
           </a:p>
+        </p:txBody>
+      </p:sp>
+      <p:sp>
+        <p:nvSpPr>
+          <p:cNvPr id="5" name="Rectangle: Rounded Corners 4">
+            <a:extLst>
+              <a:ext uri="{FF2B5EF4-FFF2-40B4-BE49-F238E27FC236}">
+                <a16:creationId xmlns:a16="http://schemas.microsoft.com/office/drawing/2014/main" id="{1027B1C5-498C-1561-D337-8DE098C8518B}"/>
+              </a:ext>
+            </a:extLst>
+          </p:cNvPr>
+          <p:cNvSpPr/>
+          <p:nvPr/>
+        </p:nvSpPr>
+        <p:spPr>
+          <a:xfrm>
+            <a:off x="2423166" y="4966855"/>
+            <a:ext cx="1323110" cy="727362"/>
+          </a:xfrm>
+          <a:prstGeom prst="roundRect">
+            <a:avLst/>
+          </a:prstGeom>
+        </p:spPr>
+        <p:style>
+          <a:lnRef idx="2">
+            <a:schemeClr val="accent1">
+              <a:shade val="15000"/>
+            </a:schemeClr>
+          </a:lnRef>
+          <a:fillRef idx="1">
+            <a:schemeClr val="accent1"/>
+          </a:fillRef>
+          <a:effectRef idx="0">
+            <a:schemeClr val="accent1"/>
+          </a:effectRef>
+          <a:fontRef idx="minor">
+            <a:schemeClr val="lt1"/>
+          </a:fontRef>
+        </p:style>
+        <p:txBody>
+          <a:bodyPr rtlCol="0" anchor="ctr"/>
+          <a:lstStyle/>
           <a:p>
-            <a:pPr marL="0" indent="0">
-              <a:buNone/>
+            <a:pPr algn="ctr"/>
+            <a:r>
+              <a:rPr lang="en-US" sz="2400" dirty="0"/>
+              <a:t>ETH</a:t>
+            </a:r>
+          </a:p>
+        </p:txBody>
+      </p:sp>
+      <p:sp>
+        <p:nvSpPr>
+          <p:cNvPr id="6" name="Rectangle: Rounded Corners 5">
+            <a:extLst>
+              <a:ext uri="{FF2B5EF4-FFF2-40B4-BE49-F238E27FC236}">
+                <a16:creationId xmlns:a16="http://schemas.microsoft.com/office/drawing/2014/main" id="{92EBA328-81A7-CD8E-EADA-C5364C097BB0}"/>
+              </a:ext>
+            </a:extLst>
+          </p:cNvPr>
+          <p:cNvSpPr/>
+          <p:nvPr/>
+        </p:nvSpPr>
+        <p:spPr>
+          <a:xfrm>
+            <a:off x="6863550" y="4966855"/>
+            <a:ext cx="1323110" cy="727362"/>
+          </a:xfrm>
+          <a:prstGeom prst="roundRect">
+            <a:avLst/>
+          </a:prstGeom>
+        </p:spPr>
+        <p:style>
+          <a:lnRef idx="2">
+            <a:schemeClr val="accent1">
+              <a:shade val="15000"/>
+            </a:schemeClr>
+          </a:lnRef>
+          <a:fillRef idx="1">
+            <a:schemeClr val="accent1"/>
+          </a:fillRef>
+          <a:effectRef idx="0">
+            <a:schemeClr val="accent1"/>
+          </a:effectRef>
+          <a:fontRef idx="minor">
+            <a:schemeClr val="lt1"/>
+          </a:fontRef>
+        </p:style>
+        <p:txBody>
+          <a:bodyPr rtlCol="0" anchor="ctr"/>
+          <a:lstStyle/>
+          <a:p>
+            <a:pPr algn="ctr"/>
+            <a:r>
+              <a:rPr lang="en-US" sz="2400" dirty="0" err="1"/>
+              <a:t>Avax</a:t>
+            </a:r>
+            <a:endParaRPr lang="en-US" dirty="0"/>
+          </a:p>
+        </p:txBody>
+      </p:sp>
+      <p:sp>
+        <p:nvSpPr>
+          <p:cNvPr id="7" name="Arrow: Left-Right 6">
+            <a:extLst>
+              <a:ext uri="{FF2B5EF4-FFF2-40B4-BE49-F238E27FC236}">
+                <a16:creationId xmlns:a16="http://schemas.microsoft.com/office/drawing/2014/main" id="{BB019602-AC5A-5484-933A-42AC5AFCC563}"/>
+              </a:ext>
+            </a:extLst>
+          </p:cNvPr>
+          <p:cNvSpPr/>
+          <p:nvPr/>
+        </p:nvSpPr>
+        <p:spPr>
+          <a:xfrm rot="17505252">
+            <a:off x="3219467" y="3724502"/>
+            <a:ext cx="1243397" cy="415636"/>
+          </a:xfrm>
+          <a:prstGeom prst="leftRightArrow">
+            <a:avLst/>
+          </a:prstGeom>
+        </p:spPr>
+        <p:style>
+          <a:lnRef idx="2">
+            <a:schemeClr val="accent1">
+              <a:shade val="15000"/>
+            </a:schemeClr>
+          </a:lnRef>
+          <a:fillRef idx="1">
+            <a:schemeClr val="accent1"/>
+          </a:fillRef>
+          <a:effectRef idx="0">
+            <a:schemeClr val="accent1"/>
+          </a:effectRef>
+          <a:fontRef idx="minor">
+            <a:schemeClr val="lt1"/>
+          </a:fontRef>
+        </p:style>
+        <p:txBody>
+          <a:bodyPr rtlCol="0" anchor="ctr"/>
+          <a:lstStyle/>
+          <a:p>
+            <a:pPr algn="ctr"/>
+            <a:endParaRPr lang="en-US"/>
+          </a:p>
+        </p:txBody>
+      </p:sp>
+      <p:sp>
+        <p:nvSpPr>
+          <p:cNvPr id="8" name="Arrow: Left-Right 7">
+            <a:extLst>
+              <a:ext uri="{FF2B5EF4-FFF2-40B4-BE49-F238E27FC236}">
+                <a16:creationId xmlns:a16="http://schemas.microsoft.com/office/drawing/2014/main" id="{C3CEF336-6A95-C572-3176-66A413EDD0C4}"/>
+              </a:ext>
+            </a:extLst>
+          </p:cNvPr>
+          <p:cNvSpPr/>
+          <p:nvPr/>
+        </p:nvSpPr>
+        <p:spPr>
+          <a:xfrm rot="3978980">
+            <a:off x="6118676" y="3730500"/>
+            <a:ext cx="1260055" cy="415636"/>
+          </a:xfrm>
+          <a:prstGeom prst="leftRightArrow">
+            <a:avLst/>
+          </a:prstGeom>
+        </p:spPr>
+        <p:style>
+          <a:lnRef idx="2">
+            <a:schemeClr val="accent1">
+              <a:shade val="15000"/>
+            </a:schemeClr>
+          </a:lnRef>
+          <a:fillRef idx="1">
+            <a:schemeClr val="accent1"/>
+          </a:fillRef>
+          <a:effectRef idx="0">
+            <a:schemeClr val="accent1"/>
+          </a:effectRef>
+          <a:fontRef idx="minor">
+            <a:schemeClr val="lt1"/>
+          </a:fontRef>
+        </p:style>
+        <p:txBody>
+          <a:bodyPr rtlCol="0" anchor="ctr"/>
+          <a:lstStyle/>
+          <a:p>
+            <a:pPr algn="ctr"/>
+            <a:endParaRPr lang="en-US"/>
+          </a:p>
+        </p:txBody>
+      </p:sp>
+      <p:sp>
+        <p:nvSpPr>
+          <p:cNvPr id="9" name="Arrow: Left-Right 8">
+            <a:extLst>
+              <a:ext uri="{FF2B5EF4-FFF2-40B4-BE49-F238E27FC236}">
+                <a16:creationId xmlns:a16="http://schemas.microsoft.com/office/drawing/2014/main" id="{A45FA7D7-5ED2-470F-F69C-9209C77AE498}"/>
+              </a:ext>
+            </a:extLst>
+          </p:cNvPr>
+          <p:cNvSpPr/>
+          <p:nvPr/>
+        </p:nvSpPr>
+        <p:spPr>
+          <a:xfrm>
+            <a:off x="4541419" y="5197782"/>
+            <a:ext cx="1526988" cy="415636"/>
+          </a:xfrm>
+          <a:prstGeom prst="leftRightArrow">
+            <a:avLst/>
+          </a:prstGeom>
+        </p:spPr>
+        <p:style>
+          <a:lnRef idx="2">
+            <a:schemeClr val="accent1">
+              <a:shade val="15000"/>
+            </a:schemeClr>
+          </a:lnRef>
+          <a:fillRef idx="1">
+            <a:schemeClr val="accent1"/>
+          </a:fillRef>
+          <a:effectRef idx="0">
+            <a:schemeClr val="accent1"/>
+          </a:effectRef>
+          <a:fontRef idx="minor">
+            <a:schemeClr val="lt1"/>
+          </a:fontRef>
+        </p:style>
+        <p:txBody>
+          <a:bodyPr rtlCol="0" anchor="ctr"/>
+          <a:lstStyle/>
+          <a:p>
+            <a:pPr algn="ctr"/>
+            <a:endParaRPr lang="en-US"/>
+          </a:p>
+        </p:txBody>
+      </p:sp>
+      <p:sp>
+        <p:nvSpPr>
+          <p:cNvPr id="11" name="TextBox 10">
+            <a:extLst>
+              <a:ext uri="{FF2B5EF4-FFF2-40B4-BE49-F238E27FC236}">
+                <a16:creationId xmlns:a16="http://schemas.microsoft.com/office/drawing/2014/main" id="{D2F8FF2C-640B-5E4B-3163-22A2E541C47E}"/>
+              </a:ext>
+            </a:extLst>
+          </p:cNvPr>
+          <p:cNvSpPr txBox="1"/>
+          <p:nvPr/>
+        </p:nvSpPr>
+        <p:spPr>
+          <a:xfrm>
+            <a:off x="4541418" y="3853193"/>
+            <a:ext cx="1526988" cy="523220"/>
+          </a:xfrm>
+          <a:prstGeom prst="rect">
+            <a:avLst/>
+          </a:prstGeom>
+          <a:noFill/>
+        </p:spPr>
+        <p:txBody>
+          <a:bodyPr wrap="square" rtlCol="0">
+            <a:spAutoFit/>
+          </a:bodyPr>
+          <a:lstStyle/>
+          <a:p>
+            <a:r>
+              <a:rPr lang="en-US" sz="2800" b="1" dirty="0"/>
+              <a:t>CCPT v2</a:t>
+            </a:r>
+          </a:p>
+        </p:txBody>
+      </p:sp>
+      <p:sp>
+        <p:nvSpPr>
+          <p:cNvPr id="12" name="TextBox 11">
+            <a:extLst>
+              <a:ext uri="{FF2B5EF4-FFF2-40B4-BE49-F238E27FC236}">
+                <a16:creationId xmlns:a16="http://schemas.microsoft.com/office/drawing/2014/main" id="{91142C8E-2653-4F9B-6FDC-A1B9E2610800}"/>
+              </a:ext>
+            </a:extLst>
+          </p:cNvPr>
+          <p:cNvSpPr txBox="1"/>
+          <p:nvPr/>
+        </p:nvSpPr>
+        <p:spPr>
+          <a:xfrm>
+            <a:off x="6863550" y="1540124"/>
+            <a:ext cx="3296002" cy="1200329"/>
+          </a:xfrm>
+          <a:prstGeom prst="rect">
+            <a:avLst/>
+          </a:prstGeom>
+          <a:noFill/>
+        </p:spPr>
+        <p:txBody>
+          <a:bodyPr wrap="square" rtlCol="0">
+            <a:spAutoFit/>
+          </a:bodyPr>
+          <a:lstStyle/>
+          <a:p>
+            <a:pPr marL="342900" indent="-342900">
+              <a:buFont typeface="Arial" panose="020B0604020202020204" pitchFamily="34" charset="0"/>
+              <a:buChar char="•"/>
             </a:pPr>
             <a:r>
-              <a:rPr lang="en-US" dirty="0"/>
-              <a:t>Most people don't use DeFi — not because they don't want to, but because it’s too complicated. Wallet setup, gas tokens, bridging, token swaps — these steps create friction and fear. We asked ourselves: “What if users didn’t need to know any of that? ”That’s how </a:t>
-            </a:r>
-            <a:r>
-              <a:rPr lang="en-US" dirty="0" err="1"/>
-              <a:t>IntentPay</a:t>
-            </a:r>
-            <a:r>
-              <a:rPr lang="en-US" dirty="0"/>
-              <a:t> was born: </a:t>
-            </a:r>
-            <a:r>
-              <a:rPr lang="en-US" b="1" dirty="0"/>
-              <a:t>a way to let anyone interact with DeFi by just saying what they want to do, and letting the system handle the rest.</a:t>
+              <a:rPr lang="en-US" sz="2400" dirty="0"/>
+              <a:t>1inch selects a different chain for the best swap route</a:t>
             </a:r>
           </a:p>
         </p:txBody>
@@ -29916,7 +30832,7 @@
     </p:spTree>
     <p:extLst>
       <p:ext uri="{BB962C8B-B14F-4D97-AF65-F5344CB8AC3E}">
-        <p14:creationId xmlns:p14="http://schemas.microsoft.com/office/powerpoint/2010/main" val="3868270765"/>
+        <p14:creationId xmlns:p14="http://schemas.microsoft.com/office/powerpoint/2010/main" val="1199128058"/>
       </p:ext>
     </p:extLst>
   </p:cSld>
@@ -29948,7 +30864,7 @@
           <p:cNvPr id="2" name="Title 1">
             <a:extLst>
               <a:ext uri="{FF2B5EF4-FFF2-40B4-BE49-F238E27FC236}">
-                <a16:creationId xmlns:a16="http://schemas.microsoft.com/office/drawing/2014/main" id="{3461F83C-1DFC-57DC-4A17-24AEC834DE29}"/>
+                <a16:creationId xmlns:a16="http://schemas.microsoft.com/office/drawing/2014/main" id="{B8837F5D-7861-3975-1FB1-A45E95906B81}"/>
               </a:ext>
             </a:extLst>
           </p:cNvPr>
@@ -29966,7 +30882,7 @@
           <a:p>
             <a:r>
               <a:rPr lang="en-US" dirty="0"/>
-              <a:t>Q2: What tools did you use, and why?</a:t>
+              <a:t>Q1: What inspired your project?</a:t>
             </a:r>
           </a:p>
         </p:txBody>
@@ -29976,7 +30892,7 @@
           <p:cNvPr id="3" name="Content Placeholder 2">
             <a:extLst>
               <a:ext uri="{FF2B5EF4-FFF2-40B4-BE49-F238E27FC236}">
-                <a16:creationId xmlns:a16="http://schemas.microsoft.com/office/drawing/2014/main" id="{F5FCDBEB-9306-9818-921C-1A5790C79403}"/>
+                <a16:creationId xmlns:a16="http://schemas.microsoft.com/office/drawing/2014/main" id="{80BD6361-DECA-F3B2-9158-5B8DEAD7ACA1}"/>
               </a:ext>
             </a:extLst>
           </p:cNvPr>
@@ -29992,72 +30908,9 @@
           <a:bodyPr/>
           <a:lstStyle/>
           <a:p>
-            <a:pPr>
-              <a:buNone/>
-            </a:pPr>
             <a:r>
               <a:rPr lang="en-US" dirty="0"/>
-              <a:t>We choose </a:t>
-            </a:r>
-          </a:p>
-          <a:p>
-            <a:r>
-              <a:rPr lang="en-US" b="1" dirty="0"/>
-              <a:t>World App</a:t>
-            </a:r>
-            <a:r>
-              <a:rPr lang="en-US" dirty="0"/>
-              <a:t> provides human identity (World ID) and authentication</a:t>
-            </a:r>
-          </a:p>
-          <a:p>
-            <a:pPr>
-              <a:buFont typeface="Arial" panose="020B0604020202020204" pitchFamily="34" charset="0"/>
-              <a:buChar char="•"/>
-            </a:pPr>
-            <a:r>
-              <a:rPr lang="en-US" b="1" dirty="0"/>
-              <a:t>1inch Fusion+</a:t>
-            </a:r>
-            <a:r>
-              <a:rPr lang="en-US" dirty="0"/>
-              <a:t> gives us MEV-protected token swaps</a:t>
-            </a:r>
-          </a:p>
-          <a:p>
-            <a:pPr>
-              <a:buFont typeface="Arial" panose="020B0604020202020204" pitchFamily="34" charset="0"/>
-              <a:buChar char="•"/>
-            </a:pPr>
-            <a:r>
-              <a:rPr lang="en-US" b="1" dirty="0"/>
-              <a:t>Circle Modular Wallet</a:t>
-            </a:r>
-            <a:r>
-              <a:rPr lang="en-US" dirty="0"/>
-              <a:t> lets us create wallets and pay gas with USDC</a:t>
-            </a:r>
-          </a:p>
-          <a:p>
-            <a:pPr>
-              <a:buFont typeface="Arial" panose="020B0604020202020204" pitchFamily="34" charset="0"/>
-              <a:buChar char="•"/>
-            </a:pPr>
-            <a:r>
-              <a:rPr lang="en-US" b="1" dirty="0"/>
-              <a:t>CCTP v2</a:t>
-            </a:r>
-            <a:r>
-              <a:rPr lang="en-US" dirty="0"/>
-              <a:t> powers fast, secure cross-chain USDC transfers for Re-balancing our </a:t>
-            </a:r>
-            <a:r>
-              <a:rPr lang="en-US" dirty="0" err="1"/>
-              <a:t>PayMaster</a:t>
-            </a:r>
-            <a:r>
-              <a:rPr lang="en-US" dirty="0"/>
-              <a:t> account</a:t>
+              <a:t>We started with a simple observation:</a:t>
             </a:r>
           </a:p>
           <a:p>
@@ -30066,18 +30919,27 @@
             </a:pPr>
             <a:r>
               <a:rPr lang="en-US" dirty="0"/>
-              <a:t>All of these tools work together to remove friction, without compromising on security or decentralization.</a:t>
-            </a:r>
-          </a:p>
-          <a:p>
-            <a:endParaRPr lang="en-US" dirty="0"/>
+              <a:t>Most people don't use DeFi — not because they don't want to, but because it’s too complicated. Wallet setup, gas tokens, bridging, token swaps — these steps create friction and fear. We asked ourselves: “What if users didn’t need to know any of that? ”That’s how </a:t>
+            </a:r>
+            <a:r>
+              <a:rPr lang="en-US" dirty="0" err="1"/>
+              <a:t>IntentPay</a:t>
+            </a:r>
+            <a:r>
+              <a:rPr lang="en-US" dirty="0"/>
+              <a:t> was born: </a:t>
+            </a:r>
+            <a:r>
+              <a:rPr lang="en-US" b="1" dirty="0"/>
+              <a:t>a way to let anyone interact with DeFi by just saying what they want to do, and letting the system handle the rest.</a:t>
+            </a:r>
           </a:p>
         </p:txBody>
       </p:sp>
     </p:spTree>
     <p:extLst>
       <p:ext uri="{BB962C8B-B14F-4D97-AF65-F5344CB8AC3E}">
-        <p14:creationId xmlns:p14="http://schemas.microsoft.com/office/powerpoint/2010/main" val="2614287631"/>
+        <p14:creationId xmlns:p14="http://schemas.microsoft.com/office/powerpoint/2010/main" val="3868270765"/>
       </p:ext>
     </p:extLst>
   </p:cSld>

</xml_diff>